<commit_message>
Created Read the Docs requirements files for documentation build.
</commit_message>
<xml_diff>
--- a/docs/source/_static/img/apca_logo.pptx
+++ b/docs/source/_static/img/apca_logo.pptx
@@ -2,12 +2,12 @@
 <file path=ppt/presentation.xml><?xml version="1.0" encoding="utf-8"?>
 <p:presentation xmlns:a="http://schemas.openxmlformats.org/drawingml/2006/main" xmlns:r="http://schemas.openxmlformats.org/officeDocument/2006/relationships" xmlns:p="http://schemas.openxmlformats.org/presentationml/2006/main" saveSubsetFonts="1">
   <p:sldMasterIdLst>
-    <p:sldMasterId id="2147483780" r:id="rId1"/>
+    <p:sldMasterId id="2147483792" r:id="rId1"/>
   </p:sldMasterIdLst>
   <p:sldIdLst>
     <p:sldId id="258" r:id="rId2"/>
   </p:sldIdLst>
-  <p:sldSz cx="11612563" cy="2057400"/>
+  <p:sldSz cx="11155363" cy="2057400"/>
   <p:notesSz cx="6858000" cy="9144000"/>
   <p:defaultTextStyle>
     <a:defPPr>
@@ -141,8 +141,8 @@
         </p:nvSpPr>
         <p:spPr>
           <a:xfrm>
-            <a:off x="1451571" y="336709"/>
-            <a:ext cx="8709422" cy="716280"/>
+            <a:off x="1394421" y="336709"/>
+            <a:ext cx="8366522" cy="716280"/>
           </a:xfrm>
         </p:spPr>
         <p:txBody>
@@ -173,8 +173,8 @@
         </p:nvSpPr>
         <p:spPr>
           <a:xfrm>
-            <a:off x="1451571" y="1080611"/>
-            <a:ext cx="8709422" cy="496729"/>
+            <a:off x="1394421" y="1080611"/>
+            <a:ext cx="8366522" cy="496729"/>
           </a:xfrm>
         </p:spPr>
         <p:txBody>
@@ -243,7 +243,7 @@
           <a:p>
             <a:fld id="{DEB3EFF7-52A9-4638-A54C-784ED58FA77B}" type="datetimeFigureOut">
               <a:rPr lang="en-US" smtClean="0"/>
-              <a:t>4/27/2021</a:t>
+              <a:t>6/3/2021</a:t>
             </a:fld>
             <a:endParaRPr lang="en-US"/>
           </a:p>
@@ -294,7 +294,7 @@
     </p:spTree>
     <p:extLst>
       <p:ext uri="{BB962C8B-B14F-4D97-AF65-F5344CB8AC3E}">
-        <p14:creationId xmlns:p14="http://schemas.microsoft.com/office/powerpoint/2010/main" val="3495402089"/>
+        <p14:creationId xmlns:p14="http://schemas.microsoft.com/office/powerpoint/2010/main" val="3489819622"/>
       </p:ext>
     </p:extLst>
   </p:cSld>
@@ -413,7 +413,7 @@
           <a:p>
             <a:fld id="{DEB3EFF7-52A9-4638-A54C-784ED58FA77B}" type="datetimeFigureOut">
               <a:rPr lang="en-US" smtClean="0"/>
-              <a:t>4/27/2021</a:t>
+              <a:t>6/3/2021</a:t>
             </a:fld>
             <a:endParaRPr lang="en-US"/>
           </a:p>
@@ -464,7 +464,7 @@
     </p:spTree>
     <p:extLst>
       <p:ext uri="{BB962C8B-B14F-4D97-AF65-F5344CB8AC3E}">
-        <p14:creationId xmlns:p14="http://schemas.microsoft.com/office/powerpoint/2010/main" val="2801126989"/>
+        <p14:creationId xmlns:p14="http://schemas.microsoft.com/office/powerpoint/2010/main" val="3421785450"/>
       </p:ext>
     </p:extLst>
   </p:cSld>
@@ -503,8 +503,8 @@
         </p:nvSpPr>
         <p:spPr>
           <a:xfrm>
-            <a:off x="8310240" y="109538"/>
-            <a:ext cx="2503959" cy="1743551"/>
+            <a:off x="7983057" y="109538"/>
+            <a:ext cx="2405375" cy="1743551"/>
           </a:xfrm>
         </p:spPr>
         <p:txBody>
@@ -531,8 +531,8 @@
         </p:nvSpPr>
         <p:spPr>
           <a:xfrm>
-            <a:off x="798364" y="109538"/>
-            <a:ext cx="7366720" cy="1743551"/>
+            <a:off x="766931" y="109538"/>
+            <a:ext cx="7076683" cy="1743551"/>
           </a:xfrm>
         </p:spPr>
         <p:txBody>
@@ -593,7 +593,7 @@
           <a:p>
             <a:fld id="{DEB3EFF7-52A9-4638-A54C-784ED58FA77B}" type="datetimeFigureOut">
               <a:rPr lang="en-US" smtClean="0"/>
-              <a:t>4/27/2021</a:t>
+              <a:t>6/3/2021</a:t>
             </a:fld>
             <a:endParaRPr lang="en-US"/>
           </a:p>
@@ -644,7 +644,7 @@
     </p:spTree>
     <p:extLst>
       <p:ext uri="{BB962C8B-B14F-4D97-AF65-F5344CB8AC3E}">
-        <p14:creationId xmlns:p14="http://schemas.microsoft.com/office/powerpoint/2010/main" val="1562866591"/>
+        <p14:creationId xmlns:p14="http://schemas.microsoft.com/office/powerpoint/2010/main" val="695722427"/>
       </p:ext>
     </p:extLst>
   </p:cSld>
@@ -763,7 +763,7 @@
           <a:p>
             <a:fld id="{DEB3EFF7-52A9-4638-A54C-784ED58FA77B}" type="datetimeFigureOut">
               <a:rPr lang="en-US" smtClean="0"/>
-              <a:t>4/27/2021</a:t>
+              <a:t>6/3/2021</a:t>
             </a:fld>
             <a:endParaRPr lang="en-US"/>
           </a:p>
@@ -814,7 +814,7 @@
     </p:spTree>
     <p:extLst>
       <p:ext uri="{BB962C8B-B14F-4D97-AF65-F5344CB8AC3E}">
-        <p14:creationId xmlns:p14="http://schemas.microsoft.com/office/powerpoint/2010/main" val="1035073487"/>
+        <p14:creationId xmlns:p14="http://schemas.microsoft.com/office/powerpoint/2010/main" val="2394468918"/>
       </p:ext>
     </p:extLst>
   </p:cSld>
@@ -853,8 +853,8 @@
         </p:nvSpPr>
         <p:spPr>
           <a:xfrm>
-            <a:off x="792315" y="512922"/>
-            <a:ext cx="10015836" cy="855821"/>
+            <a:off x="761121" y="512922"/>
+            <a:ext cx="9621501" cy="855821"/>
           </a:xfrm>
         </p:spPr>
         <p:txBody>
@@ -885,8 +885,8 @@
         </p:nvSpPr>
         <p:spPr>
           <a:xfrm>
-            <a:off x="792315" y="1376839"/>
-            <a:ext cx="10015836" cy="450056"/>
+            <a:off x="761121" y="1376839"/>
+            <a:ext cx="9621501" cy="450056"/>
           </a:xfrm>
         </p:spPr>
         <p:txBody>
@@ -1009,7 +1009,7 @@
           <a:p>
             <a:fld id="{DEB3EFF7-52A9-4638-A54C-784ED58FA77B}" type="datetimeFigureOut">
               <a:rPr lang="en-US" smtClean="0"/>
-              <a:t>4/27/2021</a:t>
+              <a:t>6/3/2021</a:t>
             </a:fld>
             <a:endParaRPr lang="en-US"/>
           </a:p>
@@ -1060,7 +1060,7 @@
     </p:spTree>
     <p:extLst>
       <p:ext uri="{BB962C8B-B14F-4D97-AF65-F5344CB8AC3E}">
-        <p14:creationId xmlns:p14="http://schemas.microsoft.com/office/powerpoint/2010/main" val="4034894117"/>
+        <p14:creationId xmlns:p14="http://schemas.microsoft.com/office/powerpoint/2010/main" val="3781247867"/>
       </p:ext>
     </p:extLst>
   </p:cSld>
@@ -1122,8 +1122,8 @@
         </p:nvSpPr>
         <p:spPr>
           <a:xfrm>
-            <a:off x="798364" y="547688"/>
-            <a:ext cx="4935339" cy="1305401"/>
+            <a:off x="766931" y="547688"/>
+            <a:ext cx="4741029" cy="1305401"/>
           </a:xfrm>
         </p:spPr>
         <p:txBody>
@@ -1179,8 +1179,8 @@
         </p:nvSpPr>
         <p:spPr>
           <a:xfrm>
-            <a:off x="5878860" y="547688"/>
-            <a:ext cx="4935339" cy="1305401"/>
+            <a:off x="5647403" y="547688"/>
+            <a:ext cx="4741029" cy="1305401"/>
           </a:xfrm>
         </p:spPr>
         <p:txBody>
@@ -1241,7 +1241,7 @@
           <a:p>
             <a:fld id="{DEB3EFF7-52A9-4638-A54C-784ED58FA77B}" type="datetimeFigureOut">
               <a:rPr lang="en-US" smtClean="0"/>
-              <a:t>4/27/2021</a:t>
+              <a:t>6/3/2021</a:t>
             </a:fld>
             <a:endParaRPr lang="en-US"/>
           </a:p>
@@ -1292,7 +1292,7 @@
     </p:spTree>
     <p:extLst>
       <p:ext uri="{BB962C8B-B14F-4D97-AF65-F5344CB8AC3E}">
-        <p14:creationId xmlns:p14="http://schemas.microsoft.com/office/powerpoint/2010/main" val="2785508989"/>
+        <p14:creationId xmlns:p14="http://schemas.microsoft.com/office/powerpoint/2010/main" val="2646213548"/>
       </p:ext>
     </p:extLst>
   </p:cSld>
@@ -1331,8 +1331,8 @@
         </p:nvSpPr>
         <p:spPr>
           <a:xfrm>
-            <a:off x="799876" y="109538"/>
-            <a:ext cx="10015836" cy="397669"/>
+            <a:off x="768384" y="109538"/>
+            <a:ext cx="9621501" cy="397669"/>
           </a:xfrm>
         </p:spPr>
         <p:txBody>
@@ -1359,8 +1359,8 @@
         </p:nvSpPr>
         <p:spPr>
           <a:xfrm>
-            <a:off x="799877" y="504349"/>
-            <a:ext cx="4912658" cy="247174"/>
+            <a:off x="768385" y="504349"/>
+            <a:ext cx="4719241" cy="247174"/>
           </a:xfrm>
         </p:spPr>
         <p:txBody>
@@ -1424,8 +1424,8 @@
         </p:nvSpPr>
         <p:spPr>
           <a:xfrm>
-            <a:off x="799877" y="751523"/>
-            <a:ext cx="4912658" cy="1105376"/>
+            <a:off x="768385" y="751523"/>
+            <a:ext cx="4719241" cy="1105376"/>
           </a:xfrm>
         </p:spPr>
         <p:txBody>
@@ -1481,8 +1481,8 @@
         </p:nvSpPr>
         <p:spPr>
           <a:xfrm>
-            <a:off x="5878860" y="504349"/>
-            <a:ext cx="4936852" cy="247174"/>
+            <a:off x="5647403" y="504349"/>
+            <a:ext cx="4742482" cy="247174"/>
           </a:xfrm>
         </p:spPr>
         <p:txBody>
@@ -1546,8 +1546,8 @@
         </p:nvSpPr>
         <p:spPr>
           <a:xfrm>
-            <a:off x="5878860" y="751523"/>
-            <a:ext cx="4936852" cy="1105376"/>
+            <a:off x="5647403" y="751523"/>
+            <a:ext cx="4742482" cy="1105376"/>
           </a:xfrm>
         </p:spPr>
         <p:txBody>
@@ -1608,7 +1608,7 @@
           <a:p>
             <a:fld id="{DEB3EFF7-52A9-4638-A54C-784ED58FA77B}" type="datetimeFigureOut">
               <a:rPr lang="en-US" smtClean="0"/>
-              <a:t>4/27/2021</a:t>
+              <a:t>6/3/2021</a:t>
             </a:fld>
             <a:endParaRPr lang="en-US"/>
           </a:p>
@@ -1659,7 +1659,7 @@
     </p:spTree>
     <p:extLst>
       <p:ext uri="{BB962C8B-B14F-4D97-AF65-F5344CB8AC3E}">
-        <p14:creationId xmlns:p14="http://schemas.microsoft.com/office/powerpoint/2010/main" val="2167894643"/>
+        <p14:creationId xmlns:p14="http://schemas.microsoft.com/office/powerpoint/2010/main" val="516786416"/>
       </p:ext>
     </p:extLst>
   </p:cSld>
@@ -1726,7 +1726,7 @@
           <a:p>
             <a:fld id="{DEB3EFF7-52A9-4638-A54C-784ED58FA77B}" type="datetimeFigureOut">
               <a:rPr lang="en-US" smtClean="0"/>
-              <a:t>4/27/2021</a:t>
+              <a:t>6/3/2021</a:t>
             </a:fld>
             <a:endParaRPr lang="en-US"/>
           </a:p>
@@ -1777,7 +1777,7 @@
     </p:spTree>
     <p:extLst>
       <p:ext uri="{BB962C8B-B14F-4D97-AF65-F5344CB8AC3E}">
-        <p14:creationId xmlns:p14="http://schemas.microsoft.com/office/powerpoint/2010/main" val="890986338"/>
+        <p14:creationId xmlns:p14="http://schemas.microsoft.com/office/powerpoint/2010/main" val="641248492"/>
       </p:ext>
     </p:extLst>
   </p:cSld>
@@ -1821,7 +1821,7 @@
           <a:p>
             <a:fld id="{DEB3EFF7-52A9-4638-A54C-784ED58FA77B}" type="datetimeFigureOut">
               <a:rPr lang="en-US" smtClean="0"/>
-              <a:t>4/27/2021</a:t>
+              <a:t>6/3/2021</a:t>
             </a:fld>
             <a:endParaRPr lang="en-US"/>
           </a:p>
@@ -1872,7 +1872,7 @@
     </p:spTree>
     <p:extLst>
       <p:ext uri="{BB962C8B-B14F-4D97-AF65-F5344CB8AC3E}">
-        <p14:creationId xmlns:p14="http://schemas.microsoft.com/office/powerpoint/2010/main" val="658313854"/>
+        <p14:creationId xmlns:p14="http://schemas.microsoft.com/office/powerpoint/2010/main" val="1509447988"/>
       </p:ext>
     </p:extLst>
   </p:cSld>
@@ -1911,8 +1911,8 @@
         </p:nvSpPr>
         <p:spPr>
           <a:xfrm>
-            <a:off x="799876" y="137160"/>
-            <a:ext cx="3745354" cy="480060"/>
+            <a:off x="768384" y="137160"/>
+            <a:ext cx="3597895" cy="480060"/>
           </a:xfrm>
         </p:spPr>
         <p:txBody>
@@ -1943,8 +1943,8 @@
         </p:nvSpPr>
         <p:spPr>
           <a:xfrm>
-            <a:off x="4936852" y="296227"/>
-            <a:ext cx="5878860" cy="1462088"/>
+            <a:off x="4742482" y="296227"/>
+            <a:ext cx="5647403" cy="1462088"/>
           </a:xfrm>
         </p:spPr>
         <p:txBody>
@@ -2028,8 +2028,8 @@
         </p:nvSpPr>
         <p:spPr>
           <a:xfrm>
-            <a:off x="799876" y="617220"/>
-            <a:ext cx="3745354" cy="1143476"/>
+            <a:off x="768384" y="617220"/>
+            <a:ext cx="3597895" cy="1143476"/>
           </a:xfrm>
         </p:spPr>
         <p:txBody>
@@ -2098,7 +2098,7 @@
           <a:p>
             <a:fld id="{DEB3EFF7-52A9-4638-A54C-784ED58FA77B}" type="datetimeFigureOut">
               <a:rPr lang="en-US" smtClean="0"/>
-              <a:t>4/27/2021</a:t>
+              <a:t>6/3/2021</a:t>
             </a:fld>
             <a:endParaRPr lang="en-US"/>
           </a:p>
@@ -2149,7 +2149,7 @@
     </p:spTree>
     <p:extLst>
       <p:ext uri="{BB962C8B-B14F-4D97-AF65-F5344CB8AC3E}">
-        <p14:creationId xmlns:p14="http://schemas.microsoft.com/office/powerpoint/2010/main" val="2810986172"/>
+        <p14:creationId xmlns:p14="http://schemas.microsoft.com/office/powerpoint/2010/main" val="3470195823"/>
       </p:ext>
     </p:extLst>
   </p:cSld>
@@ -2188,8 +2188,8 @@
         </p:nvSpPr>
         <p:spPr>
           <a:xfrm>
-            <a:off x="799876" y="137160"/>
-            <a:ext cx="3745354" cy="480060"/>
+            <a:off x="768384" y="137160"/>
+            <a:ext cx="3597895" cy="480060"/>
           </a:xfrm>
         </p:spPr>
         <p:txBody>
@@ -2220,8 +2220,8 @@
         </p:nvSpPr>
         <p:spPr>
           <a:xfrm>
-            <a:off x="4936852" y="296227"/>
-            <a:ext cx="5878860" cy="1462088"/>
+            <a:off x="4742482" y="296227"/>
+            <a:ext cx="5647403" cy="1462088"/>
           </a:xfrm>
         </p:spPr>
         <p:txBody>
@@ -2285,8 +2285,8 @@
         </p:nvSpPr>
         <p:spPr>
           <a:xfrm>
-            <a:off x="799876" y="617220"/>
-            <a:ext cx="3745354" cy="1143476"/>
+            <a:off x="768384" y="617220"/>
+            <a:ext cx="3597895" cy="1143476"/>
           </a:xfrm>
         </p:spPr>
         <p:txBody>
@@ -2355,7 +2355,7 @@
           <a:p>
             <a:fld id="{DEB3EFF7-52A9-4638-A54C-784ED58FA77B}" type="datetimeFigureOut">
               <a:rPr lang="en-US" smtClean="0"/>
-              <a:t>4/27/2021</a:t>
+              <a:t>6/3/2021</a:t>
             </a:fld>
             <a:endParaRPr lang="en-US"/>
           </a:p>
@@ -2406,7 +2406,7 @@
     </p:spTree>
     <p:extLst>
       <p:ext uri="{BB962C8B-B14F-4D97-AF65-F5344CB8AC3E}">
-        <p14:creationId xmlns:p14="http://schemas.microsoft.com/office/powerpoint/2010/main" val="744426474"/>
+        <p14:creationId xmlns:p14="http://schemas.microsoft.com/office/powerpoint/2010/main" val="2802036522"/>
       </p:ext>
     </p:extLst>
   </p:cSld>
@@ -2450,8 +2450,8 @@
         </p:nvSpPr>
         <p:spPr>
           <a:xfrm>
-            <a:off x="798364" y="109538"/>
-            <a:ext cx="10015836" cy="397669"/>
+            <a:off x="766931" y="109538"/>
+            <a:ext cx="9621501" cy="397669"/>
           </a:xfrm>
           <a:prstGeom prst="rect">
             <a:avLst/>
@@ -2483,8 +2483,8 @@
         </p:nvSpPr>
         <p:spPr>
           <a:xfrm>
-            <a:off x="798364" y="547688"/>
-            <a:ext cx="10015836" cy="1305401"/>
+            <a:off x="766931" y="547688"/>
+            <a:ext cx="9621501" cy="1305401"/>
           </a:xfrm>
           <a:prstGeom prst="rect">
             <a:avLst/>
@@ -2545,8 +2545,8 @@
         </p:nvSpPr>
         <p:spPr>
           <a:xfrm>
-            <a:off x="798364" y="1906905"/>
-            <a:ext cx="2612827" cy="109538"/>
+            <a:off x="766931" y="1906905"/>
+            <a:ext cx="2509957" cy="109538"/>
           </a:xfrm>
           <a:prstGeom prst="rect">
             <a:avLst/>
@@ -2568,7 +2568,7 @@
           <a:p>
             <a:fld id="{DEB3EFF7-52A9-4638-A54C-784ED58FA77B}" type="datetimeFigureOut">
               <a:rPr lang="en-US" smtClean="0"/>
-              <a:t>4/27/2021</a:t>
+              <a:t>6/3/2021</a:t>
             </a:fld>
             <a:endParaRPr lang="en-US"/>
           </a:p>
@@ -2586,8 +2586,8 @@
         </p:nvSpPr>
         <p:spPr>
           <a:xfrm>
-            <a:off x="3846662" y="1906905"/>
-            <a:ext cx="3919240" cy="109538"/>
+            <a:off x="3695214" y="1906905"/>
+            <a:ext cx="3764935" cy="109538"/>
           </a:xfrm>
           <a:prstGeom prst="rect">
             <a:avLst/>
@@ -2623,8 +2623,8 @@
         </p:nvSpPr>
         <p:spPr>
           <a:xfrm>
-            <a:off x="8201372" y="1906905"/>
-            <a:ext cx="2612827" cy="109538"/>
+            <a:off x="7878475" y="1906905"/>
+            <a:ext cx="2509957" cy="109538"/>
           </a:xfrm>
           <a:prstGeom prst="rect">
             <a:avLst/>
@@ -2655,23 +2655,23 @@
     </p:spTree>
     <p:extLst>
       <p:ext uri="{BB962C8B-B14F-4D97-AF65-F5344CB8AC3E}">
-        <p14:creationId xmlns:p14="http://schemas.microsoft.com/office/powerpoint/2010/main" val="421169794"/>
+        <p14:creationId xmlns:p14="http://schemas.microsoft.com/office/powerpoint/2010/main" val="2439935891"/>
       </p:ext>
     </p:extLst>
   </p:cSld>
   <p:clrMap bg1="lt1" tx1="dk1" bg2="lt2" tx2="dk2" accent1="accent1" accent2="accent2" accent3="accent3" accent4="accent4" accent5="accent5" accent6="accent6" hlink="hlink" folHlink="folHlink"/>
   <p:sldLayoutIdLst>
-    <p:sldLayoutId id="2147483781" r:id="rId1"/>
-    <p:sldLayoutId id="2147483782" r:id="rId2"/>
-    <p:sldLayoutId id="2147483783" r:id="rId3"/>
-    <p:sldLayoutId id="2147483784" r:id="rId4"/>
-    <p:sldLayoutId id="2147483785" r:id="rId5"/>
-    <p:sldLayoutId id="2147483786" r:id="rId6"/>
-    <p:sldLayoutId id="2147483787" r:id="rId7"/>
-    <p:sldLayoutId id="2147483788" r:id="rId8"/>
-    <p:sldLayoutId id="2147483789" r:id="rId9"/>
-    <p:sldLayoutId id="2147483790" r:id="rId10"/>
-    <p:sldLayoutId id="2147483791" r:id="rId11"/>
+    <p:sldLayoutId id="2147483793" r:id="rId1"/>
+    <p:sldLayoutId id="2147483794" r:id="rId2"/>
+    <p:sldLayoutId id="2147483795" r:id="rId3"/>
+    <p:sldLayoutId id="2147483796" r:id="rId4"/>
+    <p:sldLayoutId id="2147483797" r:id="rId5"/>
+    <p:sldLayoutId id="2147483798" r:id="rId6"/>
+    <p:sldLayoutId id="2147483799" r:id="rId7"/>
+    <p:sldLayoutId id="2147483800" r:id="rId8"/>
+    <p:sldLayoutId id="2147483801" r:id="rId9"/>
+    <p:sldLayoutId id="2147483802" r:id="rId10"/>
+    <p:sldLayoutId id="2147483803" r:id="rId11"/>
   </p:sldLayoutIdLst>
   <p:txStyles>
     <p:titleStyle>
@@ -2997,7 +2997,7 @@
         </p:nvSpPr>
         <p:spPr>
           <a:xfrm>
-            <a:off x="3" y="-1"/>
+            <a:off x="4" y="0"/>
             <a:ext cx="1481325" cy="1486463"/>
           </a:xfrm>
           <a:prstGeom prst="rect">
@@ -3060,7 +3060,7 @@
         </p:nvSpPr>
         <p:spPr>
           <a:xfrm>
-            <a:off x="1645920" y="10"/>
+            <a:off x="1645920" y="14"/>
             <a:ext cx="411480" cy="1486463"/>
           </a:xfrm>
           <a:prstGeom prst="rect">
@@ -3120,7 +3120,7 @@
         </p:nvSpPr>
         <p:spPr>
           <a:xfrm>
-            <a:off x="0" y="1645920"/>
+            <a:off x="0" y="1645921"/>
             <a:ext cx="1481324" cy="411480"/>
           </a:xfrm>
           <a:prstGeom prst="rect">
@@ -3180,7 +3180,7 @@
         </p:nvSpPr>
         <p:spPr>
           <a:xfrm>
-            <a:off x="1645920" y="1645920"/>
+            <a:off x="1645920" y="1645921"/>
             <a:ext cx="411480" cy="411480"/>
           </a:xfrm>
           <a:prstGeom prst="rect">
@@ -3240,8 +3240,8 @@
         </p:nvSpPr>
         <p:spPr>
           <a:xfrm>
-            <a:off x="2242248" y="365722"/>
-            <a:ext cx="9148763" cy="1431161"/>
+            <a:off x="2242251" y="365724"/>
+            <a:ext cx="9148763" cy="1463592"/>
           </a:xfrm>
           <a:prstGeom prst="rect">
             <a:avLst/>
@@ -3291,8 +3291,8 @@
         </p:nvSpPr>
         <p:spPr>
           <a:xfrm>
-            <a:off x="9038351" y="365721"/>
-            <a:ext cx="2220481" cy="1431161"/>
+            <a:off x="8989043" y="365723"/>
+            <a:ext cx="2269793" cy="1463592"/>
           </a:xfrm>
           <a:prstGeom prst="rect">
             <a:avLst/>
@@ -3335,8 +3335,8 @@
         </p:nvSpPr>
         <p:spPr>
           <a:xfrm>
-            <a:off x="178570" y="112288"/>
-            <a:ext cx="1136851" cy="1261884"/>
+            <a:off x="155509" y="112290"/>
+            <a:ext cx="1159913" cy="1290215"/>
           </a:xfrm>
           <a:prstGeom prst="rect">
             <a:avLst/>

</xml_diff>